<commit_message>
updates to lecture 3 slides
</commit_message>
<xml_diff>
--- a/Lectures/Class_3.pptx
+++ b/Lectures/Class_3.pptx
@@ -5,7 +5,7 @@
     <p:sldMasterId id="2147483648" r:id="rId1"/>
   </p:sldMasterIdLst>
   <p:notesMasterIdLst>
-    <p:notesMasterId r:id="rId17"/>
+    <p:notesMasterId r:id="rId18"/>
   </p:notesMasterIdLst>
   <p:sldIdLst>
     <p:sldId id="256" r:id="rId2"/>
@@ -21,8 +21,9 @@
     <p:sldId id="272" r:id="rId12"/>
     <p:sldId id="271" r:id="rId13"/>
     <p:sldId id="268" r:id="rId14"/>
-    <p:sldId id="269" r:id="rId15"/>
-    <p:sldId id="261" r:id="rId16"/>
+    <p:sldId id="273" r:id="rId15"/>
+    <p:sldId id="269" r:id="rId16"/>
+    <p:sldId id="261" r:id="rId17"/>
   </p:sldIdLst>
   <p:sldSz cx="12192000" cy="6858000"/>
   <p:notesSz cx="6858000" cy="9144000"/>
@@ -211,7 +212,7 @@
           <a:p>
             <a:fld id="{54847EFF-C863-C140-9952-3F1EB1196378}" type="datetimeFigureOut">
               <a:rPr lang="en-US" smtClean="0"/>
-              <a:t>1/27/20</a:t>
+              <a:t>1/28/20</a:t>
             </a:fld>
             <a:endParaRPr lang="en-US"/>
           </a:p>
@@ -610,7 +611,7 @@
           <a:p>
             <a:fld id="{5D36DD4B-AC82-DE42-B24B-3A0669FDECBA}" type="datetimeFigureOut">
               <a:rPr lang="en-US" smtClean="0"/>
-              <a:t>1/27/20</a:t>
+              <a:t>1/28/20</a:t>
             </a:fld>
             <a:endParaRPr lang="en-US"/>
           </a:p>
@@ -780,7 +781,7 @@
           <a:p>
             <a:fld id="{5D36DD4B-AC82-DE42-B24B-3A0669FDECBA}" type="datetimeFigureOut">
               <a:rPr lang="en-US" smtClean="0"/>
-              <a:t>1/27/20</a:t>
+              <a:t>1/28/20</a:t>
             </a:fld>
             <a:endParaRPr lang="en-US"/>
           </a:p>
@@ -960,7 +961,7 @@
           <a:p>
             <a:fld id="{5D36DD4B-AC82-DE42-B24B-3A0669FDECBA}" type="datetimeFigureOut">
               <a:rPr lang="en-US" smtClean="0"/>
-              <a:t>1/27/20</a:t>
+              <a:t>1/28/20</a:t>
             </a:fld>
             <a:endParaRPr lang="en-US"/>
           </a:p>
@@ -1130,7 +1131,7 @@
           <a:p>
             <a:fld id="{5D36DD4B-AC82-DE42-B24B-3A0669FDECBA}" type="datetimeFigureOut">
               <a:rPr lang="en-US" smtClean="0"/>
-              <a:t>1/27/20</a:t>
+              <a:t>1/28/20</a:t>
             </a:fld>
             <a:endParaRPr lang="en-US"/>
           </a:p>
@@ -1376,7 +1377,7 @@
           <a:p>
             <a:fld id="{5D36DD4B-AC82-DE42-B24B-3A0669FDECBA}" type="datetimeFigureOut">
               <a:rPr lang="en-US" smtClean="0"/>
-              <a:t>1/27/20</a:t>
+              <a:t>1/28/20</a:t>
             </a:fld>
             <a:endParaRPr lang="en-US"/>
           </a:p>
@@ -1608,7 +1609,7 @@
           <a:p>
             <a:fld id="{5D36DD4B-AC82-DE42-B24B-3A0669FDECBA}" type="datetimeFigureOut">
               <a:rPr lang="en-US" smtClean="0"/>
-              <a:t>1/27/20</a:t>
+              <a:t>1/28/20</a:t>
             </a:fld>
             <a:endParaRPr lang="en-US"/>
           </a:p>
@@ -1975,7 +1976,7 @@
           <a:p>
             <a:fld id="{5D36DD4B-AC82-DE42-B24B-3A0669FDECBA}" type="datetimeFigureOut">
               <a:rPr lang="en-US" smtClean="0"/>
-              <a:t>1/27/20</a:t>
+              <a:t>1/28/20</a:t>
             </a:fld>
             <a:endParaRPr lang="en-US"/>
           </a:p>
@@ -2093,7 +2094,7 @@
           <a:p>
             <a:fld id="{5D36DD4B-AC82-DE42-B24B-3A0669FDECBA}" type="datetimeFigureOut">
               <a:rPr lang="en-US" smtClean="0"/>
-              <a:t>1/27/20</a:t>
+              <a:t>1/28/20</a:t>
             </a:fld>
             <a:endParaRPr lang="en-US"/>
           </a:p>
@@ -2188,7 +2189,7 @@
           <a:p>
             <a:fld id="{5D36DD4B-AC82-DE42-B24B-3A0669FDECBA}" type="datetimeFigureOut">
               <a:rPr lang="en-US" smtClean="0"/>
-              <a:t>1/27/20</a:t>
+              <a:t>1/28/20</a:t>
             </a:fld>
             <a:endParaRPr lang="en-US"/>
           </a:p>
@@ -2465,7 +2466,7 @@
           <a:p>
             <a:fld id="{5D36DD4B-AC82-DE42-B24B-3A0669FDECBA}" type="datetimeFigureOut">
               <a:rPr lang="en-US" smtClean="0"/>
-              <a:t>1/27/20</a:t>
+              <a:t>1/28/20</a:t>
             </a:fld>
             <a:endParaRPr lang="en-US"/>
           </a:p>
@@ -2718,7 +2719,7 @@
           <a:p>
             <a:fld id="{5D36DD4B-AC82-DE42-B24B-3A0669FDECBA}" type="datetimeFigureOut">
               <a:rPr lang="en-US" smtClean="0"/>
-              <a:t>1/27/20</a:t>
+              <a:t>1/28/20</a:t>
             </a:fld>
             <a:endParaRPr lang="en-US"/>
           </a:p>
@@ -2931,7 +2932,7 @@
           <a:p>
             <a:fld id="{5D36DD4B-AC82-DE42-B24B-3A0669FDECBA}" type="datetimeFigureOut">
               <a:rPr lang="en-US" smtClean="0"/>
-              <a:t>1/27/20</a:t>
+              <a:t>1/28/20</a:t>
             </a:fld>
             <a:endParaRPr lang="en-US"/>
           </a:p>
@@ -3437,8 +3438,8 @@
         </p:nvSpPr>
         <p:spPr>
           <a:xfrm>
-            <a:off x="838200" y="324090"/>
-            <a:ext cx="10515600" cy="6308203"/>
+            <a:off x="838200" y="162045"/>
+            <a:ext cx="10515600" cy="6533910"/>
           </a:xfrm>
         </p:spPr>
         <p:txBody>
@@ -3450,7 +3451,7 @@
             <a:pPr fontAlgn="base"/>
             <a:r>
               <a:rPr lang="en-US" b="1" dirty="0" smtClean="0"/>
-              <a:t>Articles</a:t>
+              <a:t>Determiners -- Articles</a:t>
             </a:r>
             <a:r>
               <a:rPr lang="en-US" b="1" dirty="0"/>
@@ -3465,7 +3466,11 @@
             <a:pPr fontAlgn="base"/>
             <a:r>
               <a:rPr lang="en-US" b="1" dirty="0"/>
-              <a:t>Demonstratives:</a:t>
+              <a:t>Determiners -- Demonstratives</a:t>
+            </a:r>
+            <a:r>
+              <a:rPr lang="en-US" b="1" dirty="0"/>
+              <a:t>:</a:t>
             </a:r>
             <a:r>
               <a:rPr lang="en-US" dirty="0"/>
@@ -3476,7 +3481,11 @@
             <a:pPr fontAlgn="base"/>
             <a:r>
               <a:rPr lang="en-US" b="1" dirty="0"/>
-              <a:t>Possessive pronouns:</a:t>
+              <a:t>Determiners -- Possessive </a:t>
+            </a:r>
+            <a:r>
+              <a:rPr lang="en-US" b="1" dirty="0"/>
+              <a:t>pronouns:</a:t>
             </a:r>
             <a:r>
               <a:rPr lang="en-US" dirty="0"/>
@@ -3487,7 +3496,11 @@
             <a:pPr fontAlgn="base"/>
             <a:r>
               <a:rPr lang="en-US" b="1" dirty="0"/>
-              <a:t>Quantifiers:</a:t>
+              <a:t>Determiners -- Quantifiers</a:t>
+            </a:r>
+            <a:r>
+              <a:rPr lang="en-US" b="1" dirty="0"/>
+              <a:t>:</a:t>
             </a:r>
             <a:r>
               <a:rPr lang="en-US" dirty="0"/>
@@ -4521,35 +4534,6 @@
           </a:p>
         </p:txBody>
       </p:sp>
-      <p:sp>
-        <p:nvSpPr>
-          <p:cNvPr id="5" name="Rectangle 4"/>
-          <p:cNvSpPr/>
-          <p:nvPr/>
-        </p:nvSpPr>
-        <p:spPr>
-          <a:xfrm>
-            <a:off x="5945157" y="3244334"/>
-            <a:ext cx="301686" cy="369332"/>
-          </a:xfrm>
-          <a:prstGeom prst="rect">
-            <a:avLst/>
-          </a:prstGeom>
-        </p:spPr>
-        <p:txBody>
-          <a:bodyPr wrap="none">
-            <a:spAutoFit/>
-          </a:bodyPr>
-          <a:lstStyle/>
-          <a:p>
-            <a:r>
-              <a:rPr lang="en-US" smtClean="0"/>
-              <a:t>1</a:t>
-            </a:r>
-            <a:endParaRPr lang="en-US"/>
-          </a:p>
-        </p:txBody>
-      </p:sp>
     </p:spTree>
     <p:extLst>
       <p:ext uri="{BB962C8B-B14F-4D97-AF65-F5344CB8AC3E}">
@@ -4596,10 +4580,193 @@
           <a:lstStyle/>
           <a:p>
             <a:r>
+              <a:rPr lang="en-US" dirty="0" smtClean="0"/>
+              <a:t>Including Multiword Expressions</a:t>
+            </a:r>
+            <a:endParaRPr lang="en-US" dirty="0"/>
+          </a:p>
+        </p:txBody>
+      </p:sp>
+      <p:sp>
+        <p:nvSpPr>
+          <p:cNvPr id="3" name="Content Placeholder 2"/>
+          <p:cNvSpPr>
+            <a:spLocks noGrp="1"/>
+          </p:cNvSpPr>
+          <p:nvPr>
+            <p:ph idx="1"/>
+          </p:nvPr>
+        </p:nvSpPr>
+        <p:spPr/>
+        <p:txBody>
+          <a:bodyPr>
+            <a:normAutofit fontScale="92500" lnSpcReduction="10000"/>
+          </a:bodyPr>
+          <a:lstStyle/>
+          <a:p>
+            <a:r>
+              <a:rPr lang="en-US" b="1" dirty="0" smtClean="0"/>
+              <a:t>N-Grams</a:t>
+            </a:r>
+            <a:r>
+              <a:rPr lang="en-US" dirty="0" smtClean="0"/>
+              <a:t>: every contiguous sequence of </a:t>
+            </a:r>
+            <a:r>
+              <a:rPr lang="en-US" i="1" dirty="0" smtClean="0"/>
+              <a:t>n</a:t>
+            </a:r>
+            <a:r>
+              <a:rPr lang="en-US" dirty="0" smtClean="0"/>
+              <a:t> words.</a:t>
+            </a:r>
+          </a:p>
+          <a:p>
+            <a:pPr lvl="1"/>
+            <a:r>
+              <a:rPr lang="en-US" dirty="0" smtClean="0"/>
+              <a:t>“my cool dog </a:t>
+            </a:r>
+            <a:r>
+              <a:rPr lang="en-US" dirty="0" err="1" smtClean="0"/>
+              <a:t>maisy</a:t>
+            </a:r>
+            <a:r>
+              <a:rPr lang="en-US" dirty="0" smtClean="0"/>
+              <a:t>” </a:t>
+            </a:r>
+            <a:r>
+              <a:rPr lang="en-US" dirty="0" smtClean="0">
+                <a:sym typeface="Wingdings"/>
+              </a:rPr>
+              <a:t> [“my cool”, ”cool dog”, “dog </a:t>
+            </a:r>
+            <a:r>
+              <a:rPr lang="en-US" dirty="0" err="1" smtClean="0">
+                <a:sym typeface="Wingdings"/>
+              </a:rPr>
+              <a:t>maisy</a:t>
+            </a:r>
+            <a:r>
+              <a:rPr lang="en-US" dirty="0" smtClean="0">
+                <a:sym typeface="Wingdings"/>
+              </a:rPr>
+              <a:t>”]</a:t>
+            </a:r>
+          </a:p>
+          <a:p>
+            <a:endParaRPr lang="en-US" dirty="0" smtClean="0">
+              <a:sym typeface="Wingdings"/>
+            </a:endParaRPr>
+          </a:p>
+          <a:p>
+            <a:r>
+              <a:rPr lang="en-US" b="1" dirty="0" smtClean="0">
+                <a:sym typeface="Wingdings"/>
+              </a:rPr>
+              <a:t>Colocation Statistics</a:t>
+            </a:r>
+            <a:r>
+              <a:rPr lang="en-US" dirty="0" smtClean="0">
+                <a:sym typeface="Wingdings"/>
+              </a:rPr>
+              <a:t>: group together words that appear together unusually often (in a statistical sense).</a:t>
+            </a:r>
+          </a:p>
+          <a:p>
+            <a:pPr lvl="1"/>
+            <a:r>
+              <a:rPr lang="en-US" dirty="0" smtClean="0">
+                <a:sym typeface="Wingdings"/>
+              </a:rPr>
+              <a:t>E.g. “New” + “York” tend to appear in this order very frequently so we could treat them as a single word whenever they appear together.</a:t>
+            </a:r>
+          </a:p>
+          <a:p>
+            <a:endParaRPr lang="en-US" dirty="0" smtClean="0">
+              <a:sym typeface="Wingdings"/>
+            </a:endParaRPr>
+          </a:p>
+          <a:p>
+            <a:r>
+              <a:rPr lang="en-US" b="1" dirty="0" smtClean="0">
+                <a:sym typeface="Wingdings"/>
+              </a:rPr>
+              <a:t>Linguistic Phrases</a:t>
+            </a:r>
+            <a:r>
+              <a:rPr lang="en-US" dirty="0" smtClean="0">
+                <a:sym typeface="Wingdings"/>
+              </a:rPr>
+              <a:t>: sequences of words that that form semantic units, often characterized by parts of speech patterns.</a:t>
+            </a:r>
+          </a:p>
+          <a:p>
+            <a:pPr lvl="1"/>
+            <a:r>
+              <a:rPr lang="en-US" dirty="0" smtClean="0">
+                <a:sym typeface="Wingdings"/>
+              </a:rPr>
+              <a:t>E.g. Adjective + Noun  “heavy book”, “fast car”, “slow computer”</a:t>
+            </a:r>
+            <a:endParaRPr lang="en-US" dirty="0">
+              <a:sym typeface="Wingdings"/>
+            </a:endParaRPr>
+          </a:p>
+          <a:p>
+            <a:endParaRPr lang="en-US" dirty="0" smtClean="0"/>
+          </a:p>
+        </p:txBody>
+      </p:sp>
+    </p:spTree>
+    <p:extLst>
+      <p:ext uri="{BB962C8B-B14F-4D97-AF65-F5344CB8AC3E}">
+        <p14:creationId xmlns:p14="http://schemas.microsoft.com/office/powerpoint/2010/main" val="1041598359"/>
+      </p:ext>
+    </p:extLst>
+  </p:cSld>
+  <p:clrMapOvr>
+    <a:masterClrMapping/>
+  </p:clrMapOvr>
+</p:sld>
+</file>
+
+<file path=ppt/slides/slide15.xml><?xml version="1.0" encoding="utf-8"?>
+<p:sld xmlns:a="http://schemas.openxmlformats.org/drawingml/2006/main" xmlns:r="http://schemas.openxmlformats.org/officeDocument/2006/relationships" xmlns:p="http://schemas.openxmlformats.org/presentationml/2006/main">
+  <p:cSld>
+    <p:spTree>
+      <p:nvGrpSpPr>
+        <p:cNvPr id="1" name=""/>
+        <p:cNvGrpSpPr/>
+        <p:nvPr/>
+      </p:nvGrpSpPr>
+      <p:grpSpPr>
+        <a:xfrm>
+          <a:off x="0" y="0"/>
+          <a:ext cx="0" cy="0"/>
+          <a:chOff x="0" y="0"/>
+          <a:chExt cx="0" cy="0"/>
+        </a:xfrm>
+      </p:grpSpPr>
+      <p:sp>
+        <p:nvSpPr>
+          <p:cNvPr id="2" name="Title 1"/>
+          <p:cNvSpPr>
+            <a:spLocks noGrp="1"/>
+          </p:cNvSpPr>
+          <p:nvPr>
+            <p:ph type="title"/>
+          </p:nvPr>
+        </p:nvSpPr>
+        <p:spPr/>
+        <p:txBody>
+          <a:bodyPr/>
+          <a:lstStyle/>
+          <a:p>
+            <a:r>
               <a:rPr lang="en-US" dirty="0"/>
               <a:t>﻿Infrequently Used Terms</a:t>
             </a:r>
-            <a:endParaRPr lang="en-US" dirty="0"/>
           </a:p>
         </p:txBody>
       </p:sp>
@@ -4622,11 +4789,7 @@
           <a:p>
             <a:r>
               <a:rPr lang="en-US" dirty="0" smtClean="0"/>
-              <a:t>Decision to remove </a:t>
-            </a:r>
-            <a:r>
-              <a:rPr lang="en-US" dirty="0" smtClean="0"/>
-              <a:t>terms that appear in fewer the X number/% of documents.</a:t>
+              <a:t>Decision to remove terms that appear in fewer the X number/% of documents.</a:t>
             </a:r>
           </a:p>
           <a:p>
@@ -4658,11 +4821,7 @@
             </a:r>
             <a:r>
               <a:rPr lang="en-US" dirty="0" smtClean="0"/>
-              <a:t>similarity, or understanding how terms relate to each other, </a:t>
-            </a:r>
-            <a:r>
-              <a:rPr lang="en-US" dirty="0" smtClean="0"/>
-              <a:t>removing infrequently used terms should theoretically not effect our analysis.</a:t>
+              <a:t>similarity, or understanding how terms relate to each other, removing infrequently used terms should theoretically not effect our analysis.</a:t>
             </a:r>
           </a:p>
           <a:p>
@@ -4682,7 +4841,6 @@
               <a:rPr lang="en-US" dirty="0" smtClean="0"/>
               <a:t>May want to collapse character classes (e.g. dollar amounts) before removing. </a:t>
             </a:r>
-            <a:endParaRPr lang="en-US" dirty="0" smtClean="0"/>
           </a:p>
         </p:txBody>
       </p:sp>
@@ -4699,7 +4857,7 @@
 </p:sld>
 </file>
 
-<file path=ppt/slides/slide15.xml><?xml version="1.0" encoding="utf-8"?>
+<file path=ppt/slides/slide16.xml><?xml version="1.0" encoding="utf-8"?>
 <p:sld xmlns:a="http://schemas.openxmlformats.org/drawingml/2006/main" xmlns:r="http://schemas.openxmlformats.org/officeDocument/2006/relationships" xmlns:p="http://schemas.openxmlformats.org/presentationml/2006/main">
   <p:cSld>
     <p:spTree>
@@ -5136,7 +5294,7 @@
         <p:spPr/>
         <p:txBody>
           <a:bodyPr>
-            <a:normAutofit/>
+            <a:normAutofit lnSpcReduction="10000"/>
           </a:bodyPr>
           <a:lstStyle/>
           <a:p>
@@ -5168,7 +5326,19 @@
               <a:rPr lang="en-US" dirty="0" smtClean="0">
                 <a:sym typeface="Wingdings"/>
               </a:rPr>
-              <a:t>How to treat proper nouns? </a:t>
+              <a:t>How to treat </a:t>
+            </a:r>
+            <a:r>
+              <a:rPr lang="en-US" dirty="0" smtClean="0">
+                <a:sym typeface="Wingdings"/>
+              </a:rPr>
+              <a:t>multi-word proper </a:t>
+            </a:r>
+            <a:r>
+              <a:rPr lang="en-US" dirty="0" smtClean="0">
+                <a:sym typeface="Wingdings"/>
+              </a:rPr>
+              <a:t>nouns? </a:t>
             </a:r>
             <a:r>
               <a:rPr lang="en-US" dirty="0" err="1" smtClean="0">
@@ -5214,8 +5384,38 @@
               <a:rPr lang="en-US" dirty="0" smtClean="0">
                 <a:sym typeface="Wingdings"/>
               </a:rPr>
-              <a:t>Tokenization of compound words (e.g. German)</a:t>
-            </a:r>
+              <a:t>Tokenization of compound words (e.g. German</a:t>
+            </a:r>
+            <a:r>
+              <a:rPr lang="en-US" dirty="0" smtClean="0">
+                <a:sym typeface="Wingdings"/>
+              </a:rPr>
+              <a:t>)</a:t>
+            </a:r>
+          </a:p>
+          <a:p>
+            <a:pPr lvl="1"/>
+            <a:r>
+              <a:rPr lang="en-US" dirty="0">
+                <a:sym typeface="Wingdings"/>
+              </a:rPr>
+              <a:t>"</a:t>
+            </a:r>
+            <a:r>
+              <a:rPr lang="en-US" dirty="0" err="1">
+                <a:sym typeface="Wingdings"/>
+              </a:rPr>
+              <a:t>Lebensversicherungsgesellschaftsangestellter</a:t>
+            </a:r>
+            <a:r>
+              <a:rPr lang="en-US" dirty="0">
+                <a:sym typeface="Wingdings"/>
+              </a:rPr>
+              <a:t>" -&gt;  "life insurance company employee"</a:t>
+            </a:r>
+            <a:endParaRPr lang="en-US" dirty="0" smtClean="0">
+              <a:sym typeface="Wingdings"/>
+            </a:endParaRPr>
           </a:p>
           <a:p>
             <a:endParaRPr lang="en-US" dirty="0">
@@ -5634,7 +5834,30 @@
               <a:rPr lang="en-US" dirty="0" smtClean="0">
                 <a:sym typeface="Wingdings"/>
               </a:rPr>
-              <a:t>Can be valuable as a way to distinguish proper nouns.</a:t>
+              <a:t>Can be valuable as a way to distinguish proper nouns</a:t>
+            </a:r>
+            <a:r>
+              <a:rPr lang="en-US" dirty="0" smtClean="0">
+                <a:sym typeface="Wingdings"/>
+              </a:rPr>
+              <a:t>.</a:t>
+            </a:r>
+          </a:p>
+          <a:p>
+            <a:r>
+              <a:rPr lang="en-US" dirty="0" smtClean="0">
+                <a:sym typeface="Wingdings"/>
+              </a:rPr>
+              <a:t>Only de-capitalize first word of sentence?</a:t>
+            </a:r>
+          </a:p>
+          <a:p>
+            <a:pPr lvl="1"/>
+            <a:r>
+              <a:rPr lang="en-US" dirty="0" smtClean="0">
+                <a:sym typeface="Wingdings"/>
+              </a:rPr>
+              <a:t>What if sentence starts with proper noun?</a:t>
             </a:r>
             <a:endParaRPr lang="en-US" dirty="0" smtClean="0"/>
           </a:p>
@@ -5718,7 +5941,6 @@
               <a:rPr lang="en-US" dirty="0"/>
               <a:t>﻿Stemming</a:t>
             </a:r>
-            <a:endParaRPr lang="en-US" dirty="0"/>
           </a:p>
         </p:txBody>
       </p:sp>
@@ -5796,7 +6018,23 @@
             <a:pPr lvl="1"/>
             <a:r>
               <a:rPr lang="en-US" dirty="0" smtClean="0"/>
-              <a:t>e.g. re + act, act + </a:t>
+              <a:t>e.g. re + </a:t>
+            </a:r>
+            <a:r>
+              <a:rPr lang="en-US" b="1" dirty="0" smtClean="0"/>
+              <a:t>act</a:t>
+            </a:r>
+            <a:r>
+              <a:rPr lang="en-US" dirty="0" smtClean="0"/>
+              <a:t>, </a:t>
+            </a:r>
+            <a:r>
+              <a:rPr lang="en-US" b="1" dirty="0" smtClean="0"/>
+              <a:t>act</a:t>
+            </a:r>
+            <a:r>
+              <a:rPr lang="en-US" dirty="0" smtClean="0"/>
+              <a:t> + </a:t>
             </a:r>
             <a:r>
               <a:rPr lang="en-US" dirty="0" err="1" smtClean="0"/>
@@ -5849,7 +6087,6 @@
               <a:rPr lang="en-US" dirty="0" smtClean="0"/>
               <a:t>ing”.</a:t>
             </a:r>
-            <a:endParaRPr lang="en-US" dirty="0" smtClean="0"/>
           </a:p>
         </p:txBody>
       </p:sp>
@@ -5943,7 +6180,6 @@
               <a:rPr lang="en-US" dirty="0"/>
               <a:t>Removal</a:t>
             </a:r>
-            <a:endParaRPr lang="en-US" dirty="0"/>
           </a:p>
         </p:txBody>
       </p:sp>
@@ -6023,7 +6259,6 @@
               <a:rPr lang="en-US" dirty="0" smtClean="0"/>
               <a:t> in context of multiword expressions? </a:t>
             </a:r>
-            <a:endParaRPr lang="en-US" dirty="0" smtClean="0"/>
           </a:p>
         </p:txBody>
       </p:sp>

</xml_diff>